<commit_message>
reworked the tests to showcase some Rhino.Mocks basics.
</commit_message>
<xml_diff>
--- a/Samples/15-minutes-with-rhino.mocks/15 Minutes With Rhino.pptx
+++ b/Samples/15-minutes-with-rhino.mocks/15 Minutes With Rhino.pptx
@@ -360,6 +360,7 @@
           <a:p>
             <a:fld id="{2B91BA72-E911-4FAD-831E-892CA3FE30B0}" type="datetimeFigureOut">
               <a:rPr lang="en-US" smtClean="0"/>
+              <a:pPr/>
               <a:t>2/27/2008</a:t>
             </a:fld>
             <a:endParaRPr lang="en-US"/>
@@ -402,6 +403,7 @@
           <a:p>
             <a:fld id="{67B93BF3-027B-473E-A434-F444EC3F9740}" type="slidenum">
               <a:rPr lang="en-US" smtClean="0"/>
+              <a:pPr/>
               <a:t>‹#›</a:t>
             </a:fld>
             <a:endParaRPr lang="en-US"/>
@@ -583,6 +585,7 @@
           <a:p>
             <a:fld id="{2B91BA72-E911-4FAD-831E-892CA3FE30B0}" type="datetimeFigureOut">
               <a:rPr lang="en-US" smtClean="0"/>
+              <a:pPr/>
               <a:t>2/27/2008</a:t>
             </a:fld>
             <a:endParaRPr lang="en-US"/>
@@ -625,6 +628,7 @@
           <a:p>
             <a:fld id="{67B93BF3-027B-473E-A434-F444EC3F9740}" type="slidenum">
               <a:rPr lang="en-US" smtClean="0"/>
+              <a:pPr/>
               <a:t>‹#›</a:t>
             </a:fld>
             <a:endParaRPr lang="en-US"/>
@@ -863,6 +867,7 @@
           <a:p>
             <a:fld id="{2B91BA72-E911-4FAD-831E-892CA3FE30B0}" type="datetimeFigureOut">
               <a:rPr lang="en-US" smtClean="0"/>
+              <a:pPr/>
               <a:t>2/27/2008</a:t>
             </a:fld>
             <a:endParaRPr lang="en-US"/>
@@ -910,6 +915,7 @@
           <a:p>
             <a:fld id="{67B93BF3-027B-473E-A434-F444EC3F9740}" type="slidenum">
               <a:rPr lang="en-US" smtClean="0"/>
+              <a:pPr/>
               <a:t>‹#›</a:t>
             </a:fld>
             <a:endParaRPr lang="en-US"/>
@@ -1042,6 +1048,7 @@
           <a:p>
             <a:fld id="{2B91BA72-E911-4FAD-831E-892CA3FE30B0}" type="datetimeFigureOut">
               <a:rPr lang="en-US" smtClean="0"/>
+              <a:pPr/>
               <a:t>2/27/2008</a:t>
             </a:fld>
             <a:endParaRPr lang="en-US"/>
@@ -1084,6 +1091,7 @@
           <a:p>
             <a:fld id="{67B93BF3-027B-473E-A434-F444EC3F9740}" type="slidenum">
               <a:rPr lang="en-US" smtClean="0"/>
+              <a:pPr/>
               <a:t>‹#›</a:t>
             </a:fld>
             <a:endParaRPr lang="en-US"/>
@@ -1400,6 +1408,7 @@
           <a:p>
             <a:fld id="{2B91BA72-E911-4FAD-831E-892CA3FE30B0}" type="datetimeFigureOut">
               <a:rPr lang="en-US" smtClean="0"/>
+              <a:pPr/>
               <a:t>2/27/2008</a:t>
             </a:fld>
             <a:endParaRPr lang="en-US"/>
@@ -1442,6 +1451,7 @@
           <a:p>
             <a:fld id="{67B93BF3-027B-473E-A434-F444EC3F9740}" type="slidenum">
               <a:rPr lang="en-US" smtClean="0"/>
+              <a:pPr/>
               <a:t>‹#›</a:t>
             </a:fld>
             <a:endParaRPr lang="en-US"/>
@@ -1687,6 +1697,7 @@
           <a:p>
             <a:fld id="{2B91BA72-E911-4FAD-831E-892CA3FE30B0}" type="datetimeFigureOut">
               <a:rPr lang="en-US" smtClean="0"/>
+              <a:pPr/>
               <a:t>2/27/2008</a:t>
             </a:fld>
             <a:endParaRPr lang="en-US"/>
@@ -1729,6 +1740,7 @@
           <a:p>
             <a:fld id="{67B93BF3-027B-473E-A434-F444EC3F9740}" type="slidenum">
               <a:rPr lang="en-US" smtClean="0"/>
+              <a:pPr/>
               <a:t>‹#›</a:t>
             </a:fld>
             <a:endParaRPr lang="en-US"/>
@@ -2109,6 +2121,7 @@
           <a:p>
             <a:fld id="{2B91BA72-E911-4FAD-831E-892CA3FE30B0}" type="datetimeFigureOut">
               <a:rPr lang="en-US" smtClean="0"/>
+              <a:pPr/>
               <a:t>2/27/2008</a:t>
             </a:fld>
             <a:endParaRPr lang="en-US"/>
@@ -2151,6 +2164,7 @@
           <a:p>
             <a:fld id="{67B93BF3-027B-473E-A434-F444EC3F9740}" type="slidenum">
               <a:rPr lang="en-US" smtClean="0"/>
+              <a:pPr/>
               <a:t>‹#›</a:t>
             </a:fld>
             <a:endParaRPr lang="en-US"/>
@@ -2224,6 +2238,7 @@
           <a:p>
             <a:fld id="{2B91BA72-E911-4FAD-831E-892CA3FE30B0}" type="datetimeFigureOut">
               <a:rPr lang="en-US" smtClean="0"/>
+              <a:pPr/>
               <a:t>2/27/2008</a:t>
             </a:fld>
             <a:endParaRPr lang="en-US"/>
@@ -2266,6 +2281,7 @@
           <a:p>
             <a:fld id="{67B93BF3-027B-473E-A434-F444EC3F9740}" type="slidenum">
               <a:rPr lang="en-US" smtClean="0"/>
+              <a:pPr/>
               <a:t>‹#›</a:t>
             </a:fld>
             <a:endParaRPr lang="en-US"/>
@@ -2314,6 +2330,7 @@
           <a:p>
             <a:fld id="{2B91BA72-E911-4FAD-831E-892CA3FE30B0}" type="datetimeFigureOut">
               <a:rPr lang="en-US" smtClean="0"/>
+              <a:pPr/>
               <a:t>2/27/2008</a:t>
             </a:fld>
             <a:endParaRPr lang="en-US"/>
@@ -2356,6 +2373,7 @@
           <a:p>
             <a:fld id="{67B93BF3-027B-473E-A434-F444EC3F9740}" type="slidenum">
               <a:rPr lang="en-US" smtClean="0"/>
+              <a:pPr/>
               <a:t>‹#›</a:t>
             </a:fld>
             <a:endParaRPr lang="en-US"/>
@@ -2592,6 +2610,7 @@
           <a:p>
             <a:fld id="{2B91BA72-E911-4FAD-831E-892CA3FE30B0}" type="datetimeFigureOut">
               <a:rPr lang="en-US" smtClean="0"/>
+              <a:pPr/>
               <a:t>2/27/2008</a:t>
             </a:fld>
             <a:endParaRPr lang="en-US"/>
@@ -2634,6 +2653,7 @@
           <a:p>
             <a:fld id="{67B93BF3-027B-473E-A434-F444EC3F9740}" type="slidenum">
               <a:rPr lang="en-US" smtClean="0"/>
+              <a:pPr/>
               <a:t>‹#›</a:t>
             </a:fld>
             <a:endParaRPr lang="en-US"/>
@@ -2958,6 +2978,7 @@
           <a:p>
             <a:fld id="{2B91BA72-E911-4FAD-831E-892CA3FE30B0}" type="datetimeFigureOut">
               <a:rPr lang="en-US" smtClean="0"/>
+              <a:pPr/>
               <a:t>2/27/2008</a:t>
             </a:fld>
             <a:endParaRPr lang="en-US"/>
@@ -3114,6 +3135,7 @@
           <a:p>
             <a:fld id="{67B93BF3-027B-473E-A434-F444EC3F9740}" type="slidenum">
               <a:rPr lang="en-US" smtClean="0"/>
+              <a:pPr/>
               <a:t>‹#›</a:t>
             </a:fld>
             <a:endParaRPr lang="en-US"/>
@@ -3395,6 +3417,7 @@
           <a:p>
             <a:fld id="{2B91BA72-E911-4FAD-831E-892CA3FE30B0}" type="datetimeFigureOut">
               <a:rPr lang="en-US" smtClean="0"/>
+              <a:pPr/>
               <a:t>2/27/2008</a:t>
             </a:fld>
             <a:endParaRPr lang="en-US"/>
@@ -3475,6 +3498,7 @@
           <a:p>
             <a:fld id="{67B93BF3-027B-473E-A434-F444EC3F9740}" type="slidenum">
               <a:rPr lang="en-US" smtClean="0"/>
+              <a:pPr/>
               <a:t>‹#›</a:t>
             </a:fld>
             <a:endParaRPr lang="en-US"/>
@@ -3977,13 +4001,7 @@
               <a:rPr lang="en-US" dirty="0" smtClean="0">
                 <a:hlinkClick r:id="rId3"/>
               </a:rPr>
-              <a:t>http://</a:t>
-            </a:r>
-            <a:r>
-              <a:rPr lang="en-US" dirty="0" smtClean="0">
-                <a:hlinkClick r:id="rId3"/>
-              </a:rPr>
-              <a:t>www.ayende.com/projects/rhino-mocks.aspx</a:t>
+              <a:t>http://www.ayende.com/projects/rhino-mocks.aspx</a:t>
             </a:r>
             <a:endParaRPr lang="en-US" dirty="0" smtClean="0"/>
           </a:p>
@@ -4328,7 +4346,6 @@
               <a:rPr lang="en-US" dirty="0" smtClean="0"/>
               <a:t>Legacy code</a:t>
             </a:r>
-            <a:endParaRPr lang="en-US" dirty="0" smtClean="0"/>
           </a:p>
         </p:txBody>
       </p:sp>
@@ -5649,71 +5666,33 @@
             <p:ph type="title"/>
           </p:nvPr>
         </p:nvSpPr>
-        <p:spPr>
-          <a:xfrm>
-            <a:off x="457200" y="155448"/>
-            <a:ext cx="8229600" cy="911352"/>
-          </a:xfrm>
-        </p:spPr>
+        <p:spPr/>
+        <p:txBody>
+          <a:bodyPr/>
+          <a:lstStyle/>
+          <a:p>
+            <a:r>
+              <a:rPr lang="en-US" dirty="0" smtClean="0"/>
+              <a:t>Enough chatter</a:t>
+            </a:r>
+            <a:endParaRPr lang="en-US" dirty="0"/>
+          </a:p>
+        </p:txBody>
+      </p:sp>
+      <p:sp>
+        <p:nvSpPr>
+          <p:cNvPr id="3" name="Text Placeholder 2"/>
+          <p:cNvSpPr>
+            <a:spLocks noGrp="1"/>
+          </p:cNvSpPr>
+          <p:nvPr>
+            <p:ph type="body" idx="1"/>
+          </p:nvPr>
+        </p:nvSpPr>
+        <p:spPr/>
         <p:txBody>
           <a:bodyPr>
             <a:normAutofit/>
-          </a:bodyPr>
-          <a:lstStyle/>
-          <a:p>
-            <a:r>
-              <a:rPr lang="en-US" dirty="0" smtClean="0"/>
-              <a:t>Structure of a test</a:t>
-            </a:r>
-            <a:endParaRPr lang="en-US" dirty="0"/>
-          </a:p>
-        </p:txBody>
-      </p:sp>
-      <p:sp>
-        <p:nvSpPr>
-          <p:cNvPr id="3" name="Content Placeholder 2"/>
-          <p:cNvSpPr>
-            <a:spLocks noGrp="1"/>
-          </p:cNvSpPr>
-          <p:nvPr>
-            <p:ph idx="1"/>
-          </p:nvPr>
-        </p:nvSpPr>
-        <p:spPr/>
-        <p:txBody>
-          <a:bodyPr>
-            <a:normAutofit/>
-          </a:bodyPr>
-          <a:lstStyle/>
-          <a:p>
-            <a:pPr marL="633222" indent="-514350">
-              <a:buNone/>
-            </a:pPr>
-            <a:endParaRPr lang="en-US" sz="2400" dirty="0" smtClean="0">
-              <a:latin typeface="Consolas" pitchFamily="49" charset="0"/>
-            </a:endParaRPr>
-          </a:p>
-        </p:txBody>
-      </p:sp>
-      <p:sp>
-        <p:nvSpPr>
-          <p:cNvPr id="4" name="TextBox 3"/>
-          <p:cNvSpPr txBox="1"/>
-          <p:nvPr/>
-        </p:nvSpPr>
-        <p:spPr>
-          <a:xfrm>
-            <a:off x="762000" y="838200"/>
-            <a:ext cx="7848600" cy="523220"/>
-          </a:xfrm>
-          <a:prstGeom prst="rect">
-            <a:avLst/>
-          </a:prstGeom>
-          <a:noFill/>
-        </p:spPr>
-        <p:txBody>
-          <a:bodyPr wrap="square" rtlCol="0">
-            <a:spAutoFit/>
           </a:bodyPr>
           <a:lstStyle/>
           <a:p>
@@ -5726,7 +5705,7 @@
                   </a:schemeClr>
                 </a:solidFill>
               </a:rPr>
-              <a:t>1. Create mocks</a:t>
+              <a:t>Lets see some code!</a:t>
             </a:r>
             <a:endParaRPr lang="en-US" sz="2800" dirty="0">
               <a:solidFill>
@@ -5744,105 +5723,6 @@
   <p:clrMapOvr>
     <a:masterClrMapping/>
   </p:clrMapOvr>
-  <p:timing>
-    <p:tnLst>
-      <p:par>
-        <p:cTn id="1" dur="indefinite" restart="never" nodeType="tmRoot">
-          <p:childTnLst>
-            <p:seq concurrent="1" nextAc="seek">
-              <p:cTn id="2" dur="indefinite" nodeType="mainSeq">
-                <p:childTnLst>
-                  <p:par>
-                    <p:cTn id="3" fill="hold">
-                      <p:stCondLst>
-                        <p:cond delay="indefinite"/>
-                      </p:stCondLst>
-                      <p:childTnLst>
-                        <p:par>
-                          <p:cTn id="4" fill="hold">
-                            <p:stCondLst>
-                              <p:cond delay="0"/>
-                            </p:stCondLst>
-                            <p:childTnLst>
-                              <p:par>
-                                <p:cTn id="5" presetID="22" presetClass="entr" presetSubtype="4" fill="hold" grpId="0" nodeType="clickEffect" nodePh="1">
-                                  <p:stCondLst>
-                                    <p:cond delay="0"/>
-                                  </p:stCondLst>
-                                  <p:endCondLst>
-                                    <p:cond evt="begin" delay="0">
-                                      <p:tn val="5"/>
-                                    </p:cond>
-                                  </p:endCondLst>
-                                  <p:childTnLst>
-                                    <p:set>
-                                      <p:cBhvr>
-                                        <p:cTn id="6" dur="1" fill="hold">
-                                          <p:stCondLst>
-                                            <p:cond delay="0"/>
-                                          </p:stCondLst>
-                                        </p:cTn>
-                                        <p:tgtEl>
-                                          <p:spTgt spid="3">
-                                            <p:txEl>
-                                              <p:pRg st="0" end="0"/>
-                                            </p:txEl>
-                                          </p:spTgt>
-                                        </p:tgtEl>
-                                        <p:attrNameLst>
-                                          <p:attrName>style.visibility</p:attrName>
-                                        </p:attrNameLst>
-                                      </p:cBhvr>
-                                      <p:to>
-                                        <p:strVal val="visible"/>
-                                      </p:to>
-                                    </p:set>
-                                    <p:animEffect transition="in" filter="wipe(down)">
-                                      <p:cBhvr>
-                                        <p:cTn id="7" dur="500"/>
-                                        <p:tgtEl>
-                                          <p:spTgt spid="3">
-                                            <p:txEl>
-                                              <p:pRg st="0" end="0"/>
-                                            </p:txEl>
-                                          </p:spTgt>
-                                        </p:tgtEl>
-                                      </p:cBhvr>
-                                    </p:animEffect>
-                                  </p:childTnLst>
-                                </p:cTn>
-                              </p:par>
-                            </p:childTnLst>
-                          </p:cTn>
-                        </p:par>
-                      </p:childTnLst>
-                    </p:cTn>
-                  </p:par>
-                </p:childTnLst>
-              </p:cTn>
-              <p:prevCondLst>
-                <p:cond evt="onPrev" delay="0">
-                  <p:tgtEl>
-                    <p:sldTgt/>
-                  </p:tgtEl>
-                </p:cond>
-              </p:prevCondLst>
-              <p:nextCondLst>
-                <p:cond evt="onNext" delay="0">
-                  <p:tgtEl>
-                    <p:sldTgt/>
-                  </p:tgtEl>
-                </p:cond>
-              </p:nextCondLst>
-            </p:seq>
-          </p:childTnLst>
-        </p:cTn>
-      </p:par>
-    </p:tnLst>
-    <p:bldLst>
-      <p:bldP spid="3" grpId="0" build="p"/>
-    </p:bldLst>
-  </p:timing>
 </p:sld>
 </file>
 

</xml_diff>

<commit_message>
added plug for CodeIncubator
</commit_message>
<xml_diff>
--- a/Samples/15-minutes-with-rhino.mocks/15 Minutes With Rhino.pptx
+++ b/Samples/15-minutes-with-rhino.mocks/15 Minutes With Rhino.pptx
@@ -362,7 +362,7 @@
             <a:fld id="{2B91BA72-E911-4FAD-831E-892CA3FE30B0}" type="datetimeFigureOut">
               <a:rPr lang="en-US" smtClean="0"/>
               <a:pPr/>
-              <a:t>2/27/2008</a:t>
+              <a:t>2/28/2008</a:t>
             </a:fld>
             <a:endParaRPr lang="en-US"/>
           </a:p>
@@ -587,7 +587,7 @@
             <a:fld id="{2B91BA72-E911-4FAD-831E-892CA3FE30B0}" type="datetimeFigureOut">
               <a:rPr lang="en-US" smtClean="0"/>
               <a:pPr/>
-              <a:t>2/27/2008</a:t>
+              <a:t>2/28/2008</a:t>
             </a:fld>
             <a:endParaRPr lang="en-US"/>
           </a:p>
@@ -869,7 +869,7 @@
             <a:fld id="{2B91BA72-E911-4FAD-831E-892CA3FE30B0}" type="datetimeFigureOut">
               <a:rPr lang="en-US" smtClean="0"/>
               <a:pPr/>
-              <a:t>2/27/2008</a:t>
+              <a:t>2/28/2008</a:t>
             </a:fld>
             <a:endParaRPr lang="en-US"/>
           </a:p>
@@ -1050,7 +1050,7 @@
             <a:fld id="{2B91BA72-E911-4FAD-831E-892CA3FE30B0}" type="datetimeFigureOut">
               <a:rPr lang="en-US" smtClean="0"/>
               <a:pPr/>
-              <a:t>2/27/2008</a:t>
+              <a:t>2/28/2008</a:t>
             </a:fld>
             <a:endParaRPr lang="en-US"/>
           </a:p>
@@ -1410,7 +1410,7 @@
             <a:fld id="{2B91BA72-E911-4FAD-831E-892CA3FE30B0}" type="datetimeFigureOut">
               <a:rPr lang="en-US" smtClean="0"/>
               <a:pPr/>
-              <a:t>2/27/2008</a:t>
+              <a:t>2/28/2008</a:t>
             </a:fld>
             <a:endParaRPr lang="en-US"/>
           </a:p>
@@ -1699,7 +1699,7 @@
             <a:fld id="{2B91BA72-E911-4FAD-831E-892CA3FE30B0}" type="datetimeFigureOut">
               <a:rPr lang="en-US" smtClean="0"/>
               <a:pPr/>
-              <a:t>2/27/2008</a:t>
+              <a:t>2/28/2008</a:t>
             </a:fld>
             <a:endParaRPr lang="en-US"/>
           </a:p>
@@ -2123,7 +2123,7 @@
             <a:fld id="{2B91BA72-E911-4FAD-831E-892CA3FE30B0}" type="datetimeFigureOut">
               <a:rPr lang="en-US" smtClean="0"/>
               <a:pPr/>
-              <a:t>2/27/2008</a:t>
+              <a:t>2/28/2008</a:t>
             </a:fld>
             <a:endParaRPr lang="en-US"/>
           </a:p>
@@ -2240,7 +2240,7 @@
             <a:fld id="{2B91BA72-E911-4FAD-831E-892CA3FE30B0}" type="datetimeFigureOut">
               <a:rPr lang="en-US" smtClean="0"/>
               <a:pPr/>
-              <a:t>2/27/2008</a:t>
+              <a:t>2/28/2008</a:t>
             </a:fld>
             <a:endParaRPr lang="en-US"/>
           </a:p>
@@ -2332,7 +2332,7 @@
             <a:fld id="{2B91BA72-E911-4FAD-831E-892CA3FE30B0}" type="datetimeFigureOut">
               <a:rPr lang="en-US" smtClean="0"/>
               <a:pPr/>
-              <a:t>2/27/2008</a:t>
+              <a:t>2/28/2008</a:t>
             </a:fld>
             <a:endParaRPr lang="en-US"/>
           </a:p>
@@ -2612,7 +2612,7 @@
             <a:fld id="{2B91BA72-E911-4FAD-831E-892CA3FE30B0}" type="datetimeFigureOut">
               <a:rPr lang="en-US" smtClean="0"/>
               <a:pPr/>
-              <a:t>2/27/2008</a:t>
+              <a:t>2/28/2008</a:t>
             </a:fld>
             <a:endParaRPr lang="en-US"/>
           </a:p>
@@ -2980,7 +2980,7 @@
             <a:fld id="{2B91BA72-E911-4FAD-831E-892CA3FE30B0}" type="datetimeFigureOut">
               <a:rPr lang="en-US" smtClean="0"/>
               <a:pPr/>
-              <a:t>2/27/2008</a:t>
+              <a:t>2/28/2008</a:t>
             </a:fld>
             <a:endParaRPr lang="en-US"/>
           </a:p>
@@ -3419,7 +3419,7 @@
             <a:fld id="{2B91BA72-E911-4FAD-831E-892CA3FE30B0}" type="datetimeFigureOut">
               <a:rPr lang="en-US" smtClean="0"/>
               <a:pPr/>
-              <a:t>2/27/2008</a:t>
+              <a:t>2/28/2008</a:t>
             </a:fld>
             <a:endParaRPr lang="en-US"/>
           </a:p>
@@ -5809,16 +5809,39 @@
           <a:p>
             <a:r>
               <a:rPr lang="en-US" dirty="0" smtClean="0"/>
-              <a:t>Me</a:t>
+              <a:t>Get this dec</a:t>
+            </a:r>
+            <a:r>
+              <a:rPr lang="en-US" dirty="0" smtClean="0"/>
+              <a:t>k &amp; code</a:t>
             </a:r>
           </a:p>
           <a:p>
             <a:pPr lvl="1"/>
             <a:r>
-              <a:rPr lang="en-US" dirty="0" smtClean="0">
+              <a:rPr lang="en-US" smtClean="0">
                 <a:hlinkClick r:id="rId3"/>
               </a:rPr>
-              <a:t>http://stevenharman.net</a:t>
+              <a:t>http://</a:t>
+            </a:r>
+            <a:r>
+              <a:rPr lang="en-US" smtClean="0">
+                <a:hlinkClick r:id="rId3"/>
+              </a:rPr>
+              <a:t>code.google.com/p/codeincubator</a:t>
+            </a:r>
+            <a:r>
+              <a:rPr lang="en-US" smtClean="0">
+                <a:hlinkClick r:id="rId3"/>
+              </a:rPr>
+              <a:t>/</a:t>
+            </a:r>
+            <a:endParaRPr lang="en-US" smtClean="0"/>
+          </a:p>
+          <a:p>
+            <a:r>
+              <a:rPr lang="en-US" dirty="0" smtClean="0"/>
+              <a:t>Me</a:t>
             </a:r>
             <a:endParaRPr lang="en-US" dirty="0" smtClean="0"/>
           </a:p>
@@ -5827,6 +5850,16 @@
             <a:r>
               <a:rPr lang="en-US" dirty="0" smtClean="0">
                 <a:hlinkClick r:id="rId4"/>
+              </a:rPr>
+              <a:t>http://stevenharman.net</a:t>
+            </a:r>
+            <a:endParaRPr lang="en-US" dirty="0" smtClean="0"/>
+          </a:p>
+          <a:p>
+            <a:pPr lvl="1"/>
+            <a:r>
+              <a:rPr lang="en-US" dirty="0" smtClean="0">
+                <a:hlinkClick r:id="rId5"/>
               </a:rPr>
               <a:t>steven@stevenharman.net</a:t>
             </a:r>
@@ -5843,7 +5876,7 @@
           <p:nvPr/>
         </p:nvPicPr>
         <p:blipFill>
-          <a:blip r:embed="rId5" cstate="print"/>
+          <a:blip r:embed="rId6" cstate="print"/>
           <a:srcRect/>
           <a:stretch>
             <a:fillRect/>

</xml_diff>